<commit_message>
Cuaderno de estudio esitado
</commit_message>
<xml_diff>
--- a/fuentes/contenidos/grado07/guion07/MapaConceptual.pptx
+++ b/fuentes/contenidos/grado07/guion07/MapaConceptual.pptx
@@ -106,7 +106,18 @@
   </p:defaultTextStyle>
   <p:extLst>
     <p:ext uri="{EFAFB233-063F-42B5-8137-9DF3F51BA10A}">
-      <p15:sldGuideLst xmlns="" xmlns:p15="http://schemas.microsoft.com/office/powerpoint/2012/main"/>
+      <p15:sldGuideLst xmlns:p15="http://schemas.microsoft.com/office/powerpoint/2012/main">
+        <p15:guide id="1" orient="horz" pos="2160">
+          <p15:clr>
+            <a:srgbClr val="A4A3A4"/>
+          </p15:clr>
+        </p15:guide>
+        <p15:guide id="2" pos="2880">
+          <p15:clr>
+            <a:srgbClr val="A4A3A4"/>
+          </p15:clr>
+        </p15:guide>
+      </p15:sldGuideLst>
     </p:ext>
   </p:extLst>
 </p:presentation>
@@ -450,7 +461,7 @@
           <a:p>
             <a:fld id="{5001C876-01F7-4317-94B9-1AE222133113}" type="datetimeFigureOut">
               <a:rPr lang="es-ES" smtClean="0"/>
-              <a:t>12/11/2015</a:t>
+              <a:t>23/01/2016</a:t>
             </a:fld>
             <a:endParaRPr lang="es-ES"/>
           </a:p>
@@ -1574,27 +1585,7 @@
                 <a:latin typeface="Arial" panose="020B0604020202020204" pitchFamily="34" charset="0"/>
                 <a:cs typeface="Arial" panose="020B0604020202020204" pitchFamily="34" charset="0"/>
               </a:rPr>
-              <a:t>m </a:t>
-            </a:r>
-            <a:r>
-              <a:rPr lang="es-ES" sz="900" dirty="0" smtClean="0">
-                <a:solidFill>
-                  <a:schemeClr val="tx1"/>
-                </a:solidFill>
-                <a:latin typeface="Arial" panose="020B0604020202020204" pitchFamily="34" charset="0"/>
-                <a:cs typeface="Arial" panose="020B0604020202020204" pitchFamily="34" charset="0"/>
-              </a:rPr>
-              <a:t>es a </a:t>
-            </a:r>
-            <a:r>
-              <a:rPr lang="es-ES" sz="900" dirty="0" smtClean="0">
-                <a:solidFill>
-                  <a:schemeClr val="tx1"/>
-                </a:solidFill>
-                <a:latin typeface="Arial" panose="020B0604020202020204" pitchFamily="34" charset="0"/>
-                <a:cs typeface="Arial" panose="020B0604020202020204" pitchFamily="34" charset="0"/>
-              </a:rPr>
-              <a:t>n</a:t>
+              <a:t>m es a n</a:t>
             </a:r>
             <a:endParaRPr lang="es-ES" sz="900" dirty="0">
               <a:solidFill>
@@ -2446,24 +2437,14 @@
           <a:p>
             <a:pPr algn="ctr"/>
             <a:r>
-              <a:rPr lang="es-ES" sz="900" dirty="0" err="1">
+              <a:rPr lang="es-ES" sz="900" smtClean="0">
                 <a:solidFill>
                   <a:schemeClr val="tx1"/>
                 </a:solidFill>
                 <a:latin typeface="Arial" panose="020B0604020202020204" pitchFamily="34" charset="0"/>
                 <a:cs typeface="Arial" panose="020B0604020202020204" pitchFamily="34" charset="0"/>
               </a:rPr>
-              <a:t>m</a:t>
-            </a:r>
-            <a:r>
-              <a:rPr lang="es-ES" sz="900" dirty="0" err="1" smtClean="0">
-                <a:solidFill>
-                  <a:schemeClr val="tx1"/>
-                </a:solidFill>
-                <a:latin typeface="Arial" panose="020B0604020202020204" pitchFamily="34" charset="0"/>
-                <a:cs typeface="Arial" panose="020B0604020202020204" pitchFamily="34" charset="0"/>
-              </a:rPr>
-              <a:t>.b</a:t>
+              <a:t>m.b </a:t>
             </a:r>
             <a:r>
               <a:rPr lang="es-ES" sz="900" dirty="0" smtClean="0">
@@ -2473,7 +2454,7 @@
                 <a:latin typeface="Arial" panose="020B0604020202020204" pitchFamily="34" charset="0"/>
                 <a:cs typeface="Arial" panose="020B0604020202020204" pitchFamily="34" charset="0"/>
               </a:rPr>
-              <a:t>=</a:t>
+              <a:t>= </a:t>
             </a:r>
             <a:r>
               <a:rPr lang="es-ES" sz="900" dirty="0" err="1" smtClean="0">
@@ -3522,13 +3503,6 @@
               </a:rPr>
               <a:t>de las magnitudes es constante</a:t>
             </a:r>
-            <a:endParaRPr lang="es-ES" sz="900" dirty="0">
-              <a:solidFill>
-                <a:schemeClr val="tx1"/>
-              </a:solidFill>
-              <a:latin typeface="Arial" panose="020B0604020202020204" pitchFamily="34" charset="0"/>
-              <a:cs typeface="Arial" panose="020B0604020202020204" pitchFamily="34" charset="0"/>
-            </a:endParaRPr>
           </a:p>
         </p:txBody>
       </p:sp>
@@ -4641,7 +4615,7 @@
   <a:extraClrSchemeLst/>
   <a:extLst>
     <a:ext uri="{05A4C25C-085E-4340-85A3-A5531E510DB2}">
-      <thm15:themeFamily xmlns="" xmlns:thm15="http://schemas.microsoft.com/office/thememl/2012/main" name="Office Theme" id="{62F939B6-93AF-4DB8-9C6B-D6C7DFDC589F}" vid="{4A3C46E8-61CC-4603-A589-7422A47A8E4A}"/>
+      <thm15:themeFamily xmlns:thm15="http://schemas.microsoft.com/office/thememl/2012/main" name="Office Theme" id="{62F939B6-93AF-4DB8-9C6B-D6C7DFDC589F}" vid="{4A3C46E8-61CC-4603-A589-7422A47A8E4A}"/>
     </a:ext>
   </a:extLst>
 </a:theme>

</xml_diff>